<commit_message>
adding pptx file for presentation
</commit_message>
<xml_diff>
--- a/DA_group2/DA_group2/spiders/Python_project.pptx
+++ b/DA_group2/DA_group2/spiders/Python_project.pptx
@@ -5,28 +5,30 @@
     <p:sldMasterId id="2147483648" r:id="rId4"/>
   </p:sldMasterIdLst>
   <p:notesMasterIdLst>
-    <p:notesMasterId r:id="rId21"/>
+    <p:notesMasterId r:id="rId23"/>
   </p:notesMasterIdLst>
   <p:handoutMasterIdLst>
-    <p:handoutMasterId r:id="rId22"/>
+    <p:handoutMasterId r:id="rId24"/>
   </p:handoutMasterIdLst>
   <p:sldIdLst>
     <p:sldId id="256" r:id="rId5"/>
-    <p:sldId id="257" r:id="rId6"/>
-    <p:sldId id="287" r:id="rId7"/>
-    <p:sldId id="258" r:id="rId8"/>
-    <p:sldId id="284" r:id="rId9"/>
-    <p:sldId id="285" r:id="rId10"/>
-    <p:sldId id="286" r:id="rId11"/>
-    <p:sldId id="260" r:id="rId12"/>
-    <p:sldId id="289" r:id="rId13"/>
-    <p:sldId id="290" r:id="rId14"/>
-    <p:sldId id="291" r:id="rId15"/>
-    <p:sldId id="292" r:id="rId16"/>
-    <p:sldId id="293" r:id="rId17"/>
-    <p:sldId id="294" r:id="rId18"/>
-    <p:sldId id="295" r:id="rId19"/>
-    <p:sldId id="268" r:id="rId20"/>
+    <p:sldId id="287" r:id="rId6"/>
+    <p:sldId id="258" r:id="rId7"/>
+    <p:sldId id="284" r:id="rId8"/>
+    <p:sldId id="285" r:id="rId9"/>
+    <p:sldId id="286" r:id="rId10"/>
+    <p:sldId id="260" r:id="rId11"/>
+    <p:sldId id="289" r:id="rId12"/>
+    <p:sldId id="290" r:id="rId13"/>
+    <p:sldId id="291" r:id="rId14"/>
+    <p:sldId id="292" r:id="rId15"/>
+    <p:sldId id="293" r:id="rId16"/>
+    <p:sldId id="294" r:id="rId17"/>
+    <p:sldId id="295" r:id="rId18"/>
+    <p:sldId id="297" r:id="rId19"/>
+    <p:sldId id="296" r:id="rId20"/>
+    <p:sldId id="298" r:id="rId21"/>
+    <p:sldId id="268" r:id="rId22"/>
   </p:sldIdLst>
   <p:sldSz cx="12192000" cy="6858000"/>
   <p:notesSz cx="6858000" cy="9144000"/>
@@ -241,7 +243,7 @@
           <a:p>
             <a:fld id="{1CA5457B-CDAE-4DEB-AEC8-C82DE2312E37}" type="datetimeFigureOut">
               <a:rPr lang="en-US" smtClean="0"/>
-              <a:t>8/28/2021</a:t>
+              <a:t>8/30/2021</a:t>
             </a:fld>
             <a:endParaRPr lang="en-US" dirty="0"/>
           </a:p>
@@ -418,7 +420,7 @@
           <a:p>
             <a:fld id="{090B78EA-28CE-41D8-9043-90E391E5F567}" type="datetimeFigureOut">
               <a:rPr lang="en-US" noProof="0" smtClean="0"/>
-              <a:t>8/28/2021</a:t>
+              <a:t>8/30/2021</a:t>
             </a:fld>
             <a:endParaRPr lang="en-US" noProof="0" dirty="0"/>
           </a:p>
@@ -25561,135 +25563,13 @@
   <p:clrMapOvr>
     <a:masterClrMapping/>
   </p:clrMapOvr>
-  <p:transition spd="slow">
-    <p:wipe/>
-  </p:transition>
-</p:sld>
-</file>
-
-<file path=ppt/slides/slide10.xml><?xml version="1.0" encoding="utf-8"?>
-<p:sld xmlns:a="http://schemas.openxmlformats.org/drawingml/2006/main" xmlns:r="http://schemas.openxmlformats.org/officeDocument/2006/relationships" xmlns:p="http://schemas.openxmlformats.org/presentationml/2006/main">
-  <p:cSld>
-    <p:spTree>
-      <p:nvGrpSpPr>
-        <p:cNvPr id="1" name=""/>
-        <p:cNvGrpSpPr/>
-        <p:nvPr/>
-      </p:nvGrpSpPr>
-      <p:grpSpPr>
-        <a:xfrm>
-          <a:off x="0" y="0"/>
-          <a:ext cx="0" cy="0"/>
-          <a:chOff x="0" y="0"/>
-          <a:chExt cx="0" cy="0"/>
-        </a:xfrm>
-      </p:grpSpPr>
-      <p:sp>
-        <p:nvSpPr>
-          <p:cNvPr id="4" name="Title 3">
-            <a:extLst>
-              <a:ext uri="{FF2B5EF4-FFF2-40B4-BE49-F238E27FC236}">
-                <a16:creationId xmlns:a16="http://schemas.microsoft.com/office/drawing/2014/main" id="{BD179B88-D43C-4A31-9A52-3498E9430782}"/>
-              </a:ext>
-            </a:extLst>
-          </p:cNvPr>
-          <p:cNvSpPr>
-            <a:spLocks noGrp="1"/>
-          </p:cNvSpPr>
-          <p:nvPr>
-            <p:ph type="title"/>
-          </p:nvPr>
-        </p:nvSpPr>
-        <p:spPr/>
-        <p:txBody>
-          <a:bodyPr>
-            <a:normAutofit/>
-          </a:bodyPr>
-          <a:lstStyle/>
-          <a:p>
-            <a:r>
-              <a:rPr lang="en-US" dirty="0" err="1"/>
-              <a:t>Webcrawling</a:t>
-            </a:r>
-            <a:endParaRPr lang="en-US" dirty="0"/>
-          </a:p>
-        </p:txBody>
-      </p:sp>
-      <p:sp>
-        <p:nvSpPr>
-          <p:cNvPr id="5" name="Text Placeholder 4">
-            <a:extLst>
-              <a:ext uri="{FF2B5EF4-FFF2-40B4-BE49-F238E27FC236}">
-                <a16:creationId xmlns:a16="http://schemas.microsoft.com/office/drawing/2014/main" id="{DCDDBE65-9AB1-4989-AF86-726591A6A128}"/>
-              </a:ext>
-            </a:extLst>
-          </p:cNvPr>
-          <p:cNvSpPr>
-            <a:spLocks noGrp="1"/>
-          </p:cNvSpPr>
-          <p:nvPr>
-            <p:ph type="body" idx="1"/>
-          </p:nvPr>
-        </p:nvSpPr>
-        <p:spPr/>
-        <p:txBody>
-          <a:bodyPr/>
-          <a:lstStyle/>
-          <a:p>
-            <a:r>
-              <a:rPr lang="en-US" dirty="0"/>
-              <a:t>With Scrapy</a:t>
-            </a:r>
-          </a:p>
-        </p:txBody>
-      </p:sp>
-      <p:sp>
-        <p:nvSpPr>
-          <p:cNvPr id="2" name="Slide Number Placeholder 1">
-            <a:extLst>
-              <a:ext uri="{FF2B5EF4-FFF2-40B4-BE49-F238E27FC236}">
-                <a16:creationId xmlns:a16="http://schemas.microsoft.com/office/drawing/2014/main" id="{8B065C75-272B-4BB5-BA23-D80E8654D621}"/>
-              </a:ext>
-            </a:extLst>
-          </p:cNvPr>
-          <p:cNvSpPr>
-            <a:spLocks noGrp="1"/>
-          </p:cNvSpPr>
-          <p:nvPr>
-            <p:ph type="sldNum" sz="quarter" idx="12"/>
-          </p:nvPr>
-        </p:nvSpPr>
-        <p:spPr/>
-        <p:txBody>
-          <a:bodyPr/>
-          <a:lstStyle/>
-          <a:p>
-            <a:fld id="{C263D6C4-4840-40CC-AC84-17E24B3B7BDE}" type="slidenum">
-              <a:rPr lang="en-US" smtClean="0"/>
-              <a:pPr/>
-              <a:t>10</a:t>
-            </a:fld>
-            <a:endParaRPr lang="en-US" dirty="0"/>
-          </a:p>
-        </p:txBody>
-      </p:sp>
-    </p:spTree>
-    <p:extLst>
-      <p:ext uri="{BB962C8B-B14F-4D97-AF65-F5344CB8AC3E}">
-        <p14:creationId xmlns:p14="http://schemas.microsoft.com/office/powerpoint/2010/main" val="2035294720"/>
-      </p:ext>
-    </p:extLst>
-  </p:cSld>
-  <p:clrMapOvr>
-    <a:masterClrMapping/>
-  </p:clrMapOvr>
-  <mc:AlternateContent xmlns:mc="http://schemas.openxmlformats.org/markup-compatibility/2006" xmlns:p14="http://schemas.microsoft.com/office/powerpoint/2010/main">
-    <mc:Choice Requires="p14">
+  <mc:AlternateContent xmlns:mc="http://schemas.openxmlformats.org/markup-compatibility/2006">
+    <mc:Choice xmlns:p14="http://schemas.microsoft.com/office/powerpoint/2010/main" Requires="p14">
       <p:transition spd="med" p14:dur="700">
         <p:fade/>
       </p:transition>
     </mc:Choice>
-    <mc:Fallback xmlns="">
+    <mc:Fallback>
       <p:transition spd="med">
         <p:fade/>
       </p:transition>
@@ -25698,7 +25578,7 @@
 </p:sld>
 </file>
 
-<file path=ppt/slides/slide11.xml><?xml version="1.0" encoding="utf-8"?>
+<file path=ppt/slides/slide10.xml><?xml version="1.0" encoding="utf-8"?>
 <p:sld xmlns:a="http://schemas.openxmlformats.org/drawingml/2006/main" xmlns:r="http://schemas.openxmlformats.org/officeDocument/2006/relationships" xmlns:p="http://schemas.openxmlformats.org/presentationml/2006/main">
   <p:cSld>
     <p:spTree>
@@ -25791,7 +25671,7 @@
                   <a:spcPts val="600"/>
                 </a:spcAft>
               </a:pPr>
-              <a:t>11</a:t>
+              <a:t>10</a:t>
             </a:fld>
             <a:endParaRPr lang="en-US" noProof="0"/>
           </a:p>
@@ -25877,10 +25757,22 @@
   <p:clrMapOvr>
     <a:masterClrMapping/>
   </p:clrMapOvr>
+  <mc:AlternateContent xmlns:mc="http://schemas.openxmlformats.org/markup-compatibility/2006">
+    <mc:Choice xmlns:p14="http://schemas.microsoft.com/office/powerpoint/2010/main" Requires="p14">
+      <p:transition spd="med" p14:dur="700">
+        <p:fade/>
+      </p:transition>
+    </mc:Choice>
+    <mc:Fallback>
+      <p:transition spd="med">
+        <p:fade/>
+      </p:transition>
+    </mc:Fallback>
+  </mc:AlternateContent>
 </p:sld>
 </file>
 
-<file path=ppt/slides/slide12.xml><?xml version="1.0" encoding="utf-8"?>
+<file path=ppt/slides/slide11.xml><?xml version="1.0" encoding="utf-8"?>
 <p:sld xmlns:a="http://schemas.openxmlformats.org/drawingml/2006/main" xmlns:r="http://schemas.openxmlformats.org/officeDocument/2006/relationships" xmlns:p="http://schemas.openxmlformats.org/presentationml/2006/main">
   <p:cSld>
     <p:spTree>
@@ -25979,7 +25871,7 @@
             <a:fld id="{C263D6C4-4840-40CC-AC84-17E24B3B7BDE}" type="slidenum">
               <a:rPr lang="en-US" smtClean="0"/>
               <a:pPr/>
-              <a:t>12</a:t>
+              <a:t>11</a:t>
             </a:fld>
             <a:endParaRPr lang="en-US" dirty="0"/>
           </a:p>
@@ -26010,7 +25902,7 @@
 </p:sld>
 </file>
 
-<file path=ppt/slides/slide13.xml><?xml version="1.0" encoding="utf-8"?>
+<file path=ppt/slides/slide12.xml><?xml version="1.0" encoding="utf-8"?>
 <p:sld xmlns:a="http://schemas.openxmlformats.org/drawingml/2006/main" xmlns:r="http://schemas.openxmlformats.org/officeDocument/2006/relationships" xmlns:p="http://schemas.openxmlformats.org/presentationml/2006/main">
   <p:cSld>
     <p:spTree>
@@ -26102,7 +25994,7 @@
                   <a:spcPts val="600"/>
                 </a:spcAft>
               </a:pPr>
-              <a:t>13</a:t>
+              <a:t>12</a:t>
             </a:fld>
             <a:endParaRPr lang="en-US" noProof="0"/>
           </a:p>
@@ -26198,10 +26090,22 @@
   <p:clrMapOvr>
     <a:masterClrMapping/>
   </p:clrMapOvr>
+  <mc:AlternateContent xmlns:mc="http://schemas.openxmlformats.org/markup-compatibility/2006">
+    <mc:Choice xmlns:p14="http://schemas.microsoft.com/office/powerpoint/2010/main" Requires="p14">
+      <p:transition spd="med" p14:dur="700">
+        <p:fade/>
+      </p:transition>
+    </mc:Choice>
+    <mc:Fallback>
+      <p:transition spd="med">
+        <p:fade/>
+      </p:transition>
+    </mc:Fallback>
+  </mc:AlternateContent>
 </p:sld>
 </file>
 
-<file path=ppt/slides/slide14.xml><?xml version="1.0" encoding="utf-8"?>
+<file path=ppt/slides/slide13.xml><?xml version="1.0" encoding="utf-8"?>
 <p:sld xmlns:a="http://schemas.openxmlformats.org/drawingml/2006/main" xmlns:r="http://schemas.openxmlformats.org/officeDocument/2006/relationships" xmlns:p="http://schemas.openxmlformats.org/presentationml/2006/main">
   <p:cSld>
     <p:spTree>
@@ -26300,7 +26204,7 @@
             <a:fld id="{C263D6C4-4840-40CC-AC84-17E24B3B7BDE}" type="slidenum">
               <a:rPr lang="en-US" smtClean="0"/>
               <a:pPr/>
-              <a:t>14</a:t>
+              <a:t>13</a:t>
             </a:fld>
             <a:endParaRPr lang="en-US" dirty="0"/>
           </a:p>
@@ -26331,7 +26235,7 @@
 </p:sld>
 </file>
 
-<file path=ppt/slides/slide15.xml><?xml version="1.0" encoding="utf-8"?>
+<file path=ppt/slides/slide14.xml><?xml version="1.0" encoding="utf-8"?>
 <p:sld xmlns:a="http://schemas.openxmlformats.org/drawingml/2006/main" xmlns:r="http://schemas.openxmlformats.org/officeDocument/2006/relationships" xmlns:p="http://schemas.openxmlformats.org/presentationml/2006/main">
   <p:cSld>
     <p:spTree>
@@ -26423,7 +26327,7 @@
                   <a:spcPts val="600"/>
                 </a:spcAft>
               </a:pPr>
-              <a:t>15</a:t>
+              <a:t>14</a:t>
             </a:fld>
             <a:endParaRPr lang="en-US" noProof="0"/>
           </a:p>
@@ -26509,10 +26413,554 @@
   <p:clrMapOvr>
     <a:masterClrMapping/>
   </p:clrMapOvr>
+  <mc:AlternateContent xmlns:mc="http://schemas.openxmlformats.org/markup-compatibility/2006">
+    <mc:Choice xmlns:p14="http://schemas.microsoft.com/office/powerpoint/2010/main" Requires="p14">
+      <p:transition spd="med" p14:dur="700">
+        <p:fade/>
+      </p:transition>
+    </mc:Choice>
+    <mc:Fallback>
+      <p:transition spd="med">
+        <p:fade/>
+      </p:transition>
+    </mc:Fallback>
+  </mc:AlternateContent>
+</p:sld>
+</file>
+
+<file path=ppt/slides/slide15.xml><?xml version="1.0" encoding="utf-8"?>
+<p:sld xmlns:a="http://schemas.openxmlformats.org/drawingml/2006/main" xmlns:r="http://schemas.openxmlformats.org/officeDocument/2006/relationships" xmlns:p="http://schemas.openxmlformats.org/presentationml/2006/main">
+  <p:cSld>
+    <p:spTree>
+      <p:nvGrpSpPr>
+        <p:cNvPr id="1" name=""/>
+        <p:cNvGrpSpPr/>
+        <p:nvPr/>
+      </p:nvGrpSpPr>
+      <p:grpSpPr>
+        <a:xfrm>
+          <a:off x="0" y="0"/>
+          <a:ext cx="0" cy="0"/>
+          <a:chOff x="0" y="0"/>
+          <a:chExt cx="0" cy="0"/>
+        </a:xfrm>
+      </p:grpSpPr>
+      <p:sp>
+        <p:nvSpPr>
+          <p:cNvPr id="4" name="Title 3">
+            <a:extLst>
+              <a:ext uri="{FF2B5EF4-FFF2-40B4-BE49-F238E27FC236}">
+                <a16:creationId xmlns:a16="http://schemas.microsoft.com/office/drawing/2014/main" id="{BD179B88-D43C-4A31-9A52-3498E9430782}"/>
+              </a:ext>
+            </a:extLst>
+          </p:cNvPr>
+          <p:cNvSpPr>
+            <a:spLocks noGrp="1"/>
+          </p:cNvSpPr>
+          <p:nvPr>
+            <p:ph type="title"/>
+          </p:nvPr>
+        </p:nvSpPr>
+        <p:spPr/>
+        <p:txBody>
+          <a:bodyPr>
+            <a:normAutofit/>
+          </a:bodyPr>
+          <a:lstStyle/>
+          <a:p>
+            <a:r>
+              <a:rPr lang="en-US" dirty="0" err="1"/>
+              <a:t>Webcrawling</a:t>
+            </a:r>
+            <a:r>
+              <a:rPr lang="en-US" dirty="0"/>
+              <a:t> results</a:t>
+            </a:r>
+          </a:p>
+        </p:txBody>
+      </p:sp>
+      <p:sp>
+        <p:nvSpPr>
+          <p:cNvPr id="5" name="Text Placeholder 4">
+            <a:extLst>
+              <a:ext uri="{FF2B5EF4-FFF2-40B4-BE49-F238E27FC236}">
+                <a16:creationId xmlns:a16="http://schemas.microsoft.com/office/drawing/2014/main" id="{DCDDBE65-9AB1-4989-AF86-726591A6A128}"/>
+              </a:ext>
+            </a:extLst>
+          </p:cNvPr>
+          <p:cNvSpPr>
+            <a:spLocks noGrp="1"/>
+          </p:cNvSpPr>
+          <p:nvPr>
+            <p:ph type="body" idx="1"/>
+          </p:nvPr>
+        </p:nvSpPr>
+        <p:spPr/>
+        <p:txBody>
+          <a:bodyPr/>
+          <a:lstStyle/>
+          <a:p>
+            <a:r>
+              <a:rPr lang="en-US" dirty="0"/>
+              <a:t>With scrapy and requests</a:t>
+            </a:r>
+          </a:p>
+        </p:txBody>
+      </p:sp>
+      <p:sp>
+        <p:nvSpPr>
+          <p:cNvPr id="2" name="Slide Number Placeholder 1">
+            <a:extLst>
+              <a:ext uri="{FF2B5EF4-FFF2-40B4-BE49-F238E27FC236}">
+                <a16:creationId xmlns:a16="http://schemas.microsoft.com/office/drawing/2014/main" id="{8B065C75-272B-4BB5-BA23-D80E8654D621}"/>
+              </a:ext>
+            </a:extLst>
+          </p:cNvPr>
+          <p:cNvSpPr>
+            <a:spLocks noGrp="1"/>
+          </p:cNvSpPr>
+          <p:nvPr>
+            <p:ph type="sldNum" sz="quarter" idx="12"/>
+          </p:nvPr>
+        </p:nvSpPr>
+        <p:spPr/>
+        <p:txBody>
+          <a:bodyPr/>
+          <a:lstStyle/>
+          <a:p>
+            <a:fld id="{C263D6C4-4840-40CC-AC84-17E24B3B7BDE}" type="slidenum">
+              <a:rPr lang="en-US" smtClean="0"/>
+              <a:pPr/>
+              <a:t>15</a:t>
+            </a:fld>
+            <a:endParaRPr lang="en-US" dirty="0"/>
+          </a:p>
+        </p:txBody>
+      </p:sp>
+    </p:spTree>
+    <p:extLst>
+      <p:ext uri="{BB962C8B-B14F-4D97-AF65-F5344CB8AC3E}">
+        <p14:creationId xmlns:p14="http://schemas.microsoft.com/office/powerpoint/2010/main" val="216954451"/>
+      </p:ext>
+    </p:extLst>
+  </p:cSld>
+  <p:clrMapOvr>
+    <a:masterClrMapping/>
+  </p:clrMapOvr>
+  <mc:AlternateContent xmlns:mc="http://schemas.openxmlformats.org/markup-compatibility/2006" xmlns:p14="http://schemas.microsoft.com/office/powerpoint/2010/main">
+    <mc:Choice Requires="p14">
+      <p:transition spd="med" p14:dur="700">
+        <p:fade/>
+      </p:transition>
+    </mc:Choice>
+    <mc:Fallback xmlns="">
+      <p:transition spd="med">
+        <p:fade/>
+      </p:transition>
+    </mc:Fallback>
+  </mc:AlternateContent>
 </p:sld>
 </file>
 
 <file path=ppt/slides/slide16.xml><?xml version="1.0" encoding="utf-8"?>
+<p:sld xmlns:a="http://schemas.openxmlformats.org/drawingml/2006/main" xmlns:r="http://schemas.openxmlformats.org/officeDocument/2006/relationships" xmlns:p="http://schemas.openxmlformats.org/presentationml/2006/main">
+  <p:cSld>
+    <p:spTree>
+      <p:nvGrpSpPr>
+        <p:cNvPr id="1" name=""/>
+        <p:cNvGrpSpPr/>
+        <p:nvPr/>
+      </p:nvGrpSpPr>
+      <p:grpSpPr>
+        <a:xfrm>
+          <a:off x="0" y="0"/>
+          <a:ext cx="0" cy="0"/>
+          <a:chOff x="0" y="0"/>
+          <a:chExt cx="0" cy="0"/>
+        </a:xfrm>
+      </p:grpSpPr>
+      <p:sp>
+        <p:nvSpPr>
+          <p:cNvPr id="16" name="Title 1">
+            <a:extLst>
+              <a:ext uri="{FF2B5EF4-FFF2-40B4-BE49-F238E27FC236}">
+                <a16:creationId xmlns:a16="http://schemas.microsoft.com/office/drawing/2014/main" id="{E29FB2B3-C4BF-42CD-9AF8-EED9B5C9509C}"/>
+              </a:ext>
+            </a:extLst>
+          </p:cNvPr>
+          <p:cNvSpPr>
+            <a:spLocks noGrp="1"/>
+          </p:cNvSpPr>
+          <p:nvPr>
+            <p:ph type="title"/>
+          </p:nvPr>
+        </p:nvSpPr>
+        <p:spPr>
+          <a:xfrm>
+            <a:off x="444500" y="542925"/>
+            <a:ext cx="11214100" cy="535531"/>
+          </a:xfrm>
+        </p:spPr>
+        <p:txBody>
+          <a:bodyPr wrap="square" anchor="t">
+            <a:normAutofit/>
+          </a:bodyPr>
+          <a:lstStyle/>
+          <a:p>
+            <a:r>
+              <a:rPr lang="en-US" dirty="0" err="1"/>
+              <a:t>Webcrawling</a:t>
+            </a:r>
+            <a:r>
+              <a:rPr lang="en-US" dirty="0"/>
+              <a:t> results</a:t>
+            </a:r>
+          </a:p>
+        </p:txBody>
+      </p:sp>
+      <p:sp>
+        <p:nvSpPr>
+          <p:cNvPr id="2" name="Slide Number Placeholder 1">
+            <a:extLst>
+              <a:ext uri="{FF2B5EF4-FFF2-40B4-BE49-F238E27FC236}">
+                <a16:creationId xmlns:a16="http://schemas.microsoft.com/office/drawing/2014/main" id="{A374826A-FAAD-4BB9-9433-59DFE7C5E8AE}"/>
+              </a:ext>
+            </a:extLst>
+          </p:cNvPr>
+          <p:cNvSpPr>
+            <a:spLocks noGrp="1"/>
+          </p:cNvSpPr>
+          <p:nvPr>
+            <p:ph type="sldNum" sz="quarter" idx="12"/>
+          </p:nvPr>
+        </p:nvSpPr>
+        <p:spPr>
+          <a:xfrm>
+            <a:off x="11252200" y="6315075"/>
+            <a:ext cx="406400" cy="365125"/>
+          </a:xfrm>
+        </p:spPr>
+        <p:txBody>
+          <a:bodyPr anchor="ctr">
+            <a:normAutofit/>
+          </a:bodyPr>
+          <a:lstStyle/>
+          <a:p>
+            <a:pPr>
+              <a:spcAft>
+                <a:spcPts val="600"/>
+              </a:spcAft>
+            </a:pPr>
+            <a:fld id="{C263D6C4-4840-40CC-AC84-17E24B3B7BDE}" type="slidenum">
+              <a:rPr lang="en-US" noProof="0" smtClean="0"/>
+              <a:pPr>
+                <a:spcAft>
+                  <a:spcPts val="600"/>
+                </a:spcAft>
+              </a:pPr>
+              <a:t>16</a:t>
+            </a:fld>
+            <a:endParaRPr lang="en-US" noProof="0"/>
+          </a:p>
+        </p:txBody>
+      </p:sp>
+      <p:sp>
+        <p:nvSpPr>
+          <p:cNvPr id="18" name="Content Placeholder 3">
+            <a:extLst>
+              <a:ext uri="{FF2B5EF4-FFF2-40B4-BE49-F238E27FC236}">
+                <a16:creationId xmlns:a16="http://schemas.microsoft.com/office/drawing/2014/main" id="{4759441F-6F6A-42D2-A9CD-74440E3940B8}"/>
+              </a:ext>
+            </a:extLst>
+          </p:cNvPr>
+          <p:cNvSpPr>
+            <a:spLocks noGrp="1"/>
+          </p:cNvSpPr>
+          <p:nvPr>
+            <p:ph type="body" sz="half" idx="2"/>
+          </p:nvPr>
+        </p:nvSpPr>
+        <p:spPr>
+          <a:xfrm>
+            <a:off x="443366" y="1444649"/>
+            <a:ext cx="3365063" cy="4579079"/>
+          </a:xfrm>
+        </p:spPr>
+        <p:txBody>
+          <a:bodyPr>
+            <a:normAutofit/>
+          </a:bodyPr>
+          <a:lstStyle/>
+          <a:p>
+            <a:pPr marL="0" indent="0">
+              <a:buNone/>
+            </a:pPr>
+            <a:r>
+              <a:rPr lang="en-GB"/>
+              <a:t>This is the result of the unit test</a:t>
+            </a:r>
+            <a:endParaRPr lang="en-SG"/>
+          </a:p>
+        </p:txBody>
+      </p:sp>
+      <p:pic>
+        <p:nvPicPr>
+          <p:cNvPr id="4" name="Picture 3" descr="Text&#10;&#10;Description automatically generated">
+            <a:extLst>
+              <a:ext uri="{FF2B5EF4-FFF2-40B4-BE49-F238E27FC236}">
+                <a16:creationId xmlns:a16="http://schemas.microsoft.com/office/drawing/2014/main" id="{654FBF4F-A9D6-4050-AC27-D512E2D4B9BF}"/>
+              </a:ext>
+            </a:extLst>
+          </p:cNvPr>
+          <p:cNvPicPr>
+            <a:picLocks noChangeAspect="1"/>
+          </p:cNvPicPr>
+          <p:nvPr/>
+        </p:nvPicPr>
+        <p:blipFill>
+          <a:blip r:embed="rId2"/>
+          <a:stretch>
+            <a:fillRect/>
+          </a:stretch>
+        </p:blipFill>
+        <p:spPr>
+          <a:xfrm>
+            <a:off x="3964290" y="2320360"/>
+            <a:ext cx="7694310" cy="2827657"/>
+          </a:xfrm>
+          <a:prstGeom prst="rect">
+            <a:avLst/>
+          </a:prstGeom>
+          <a:noFill/>
+        </p:spPr>
+      </p:pic>
+    </p:spTree>
+    <p:extLst>
+      <p:ext uri="{BB962C8B-B14F-4D97-AF65-F5344CB8AC3E}">
+        <p14:creationId xmlns:p14="http://schemas.microsoft.com/office/powerpoint/2010/main" val="1264392584"/>
+      </p:ext>
+    </p:extLst>
+  </p:cSld>
+  <p:clrMapOvr>
+    <a:masterClrMapping/>
+  </p:clrMapOvr>
+  <mc:AlternateContent xmlns:mc="http://schemas.openxmlformats.org/markup-compatibility/2006">
+    <mc:Choice xmlns:p14="http://schemas.microsoft.com/office/powerpoint/2010/main" Requires="p14">
+      <p:transition spd="med" p14:dur="700">
+        <p:fade/>
+      </p:transition>
+    </mc:Choice>
+    <mc:Fallback>
+      <p:transition spd="med">
+        <p:fade/>
+      </p:transition>
+    </mc:Fallback>
+  </mc:AlternateContent>
+</p:sld>
+</file>
+
+<file path=ppt/slides/slide17.xml><?xml version="1.0" encoding="utf-8"?>
+<p:sld xmlns:a="http://schemas.openxmlformats.org/drawingml/2006/main" xmlns:r="http://schemas.openxmlformats.org/officeDocument/2006/relationships" xmlns:p="http://schemas.openxmlformats.org/presentationml/2006/main">
+  <p:cSld>
+    <p:spTree>
+      <p:nvGrpSpPr>
+        <p:cNvPr id="1" name=""/>
+        <p:cNvGrpSpPr/>
+        <p:nvPr/>
+      </p:nvGrpSpPr>
+      <p:grpSpPr>
+        <a:xfrm>
+          <a:off x="0" y="0"/>
+          <a:ext cx="0" cy="0"/>
+          <a:chOff x="0" y="0"/>
+          <a:chExt cx="0" cy="0"/>
+        </a:xfrm>
+      </p:grpSpPr>
+      <p:sp>
+        <p:nvSpPr>
+          <p:cNvPr id="16" name="Title 1">
+            <a:extLst>
+              <a:ext uri="{FF2B5EF4-FFF2-40B4-BE49-F238E27FC236}">
+                <a16:creationId xmlns:a16="http://schemas.microsoft.com/office/drawing/2014/main" id="{E29FB2B3-C4BF-42CD-9AF8-EED9B5C9509C}"/>
+              </a:ext>
+            </a:extLst>
+          </p:cNvPr>
+          <p:cNvSpPr>
+            <a:spLocks noGrp="1"/>
+          </p:cNvSpPr>
+          <p:nvPr>
+            <p:ph type="title"/>
+          </p:nvPr>
+        </p:nvSpPr>
+        <p:spPr>
+          <a:xfrm>
+            <a:off x="444500" y="542925"/>
+            <a:ext cx="11214100" cy="535531"/>
+          </a:xfrm>
+        </p:spPr>
+        <p:txBody>
+          <a:bodyPr wrap="square" anchor="t">
+            <a:normAutofit/>
+          </a:bodyPr>
+          <a:lstStyle/>
+          <a:p>
+            <a:r>
+              <a:rPr lang="en-US" dirty="0" err="1"/>
+              <a:t>Webcrawling</a:t>
+            </a:r>
+            <a:r>
+              <a:rPr lang="en-US" dirty="0"/>
+              <a:t> results</a:t>
+            </a:r>
+          </a:p>
+        </p:txBody>
+      </p:sp>
+      <p:sp>
+        <p:nvSpPr>
+          <p:cNvPr id="2" name="Slide Number Placeholder 1">
+            <a:extLst>
+              <a:ext uri="{FF2B5EF4-FFF2-40B4-BE49-F238E27FC236}">
+                <a16:creationId xmlns:a16="http://schemas.microsoft.com/office/drawing/2014/main" id="{A374826A-FAAD-4BB9-9433-59DFE7C5E8AE}"/>
+              </a:ext>
+            </a:extLst>
+          </p:cNvPr>
+          <p:cNvSpPr>
+            <a:spLocks noGrp="1"/>
+          </p:cNvSpPr>
+          <p:nvPr>
+            <p:ph type="sldNum" sz="quarter" idx="12"/>
+          </p:nvPr>
+        </p:nvSpPr>
+        <p:spPr>
+          <a:xfrm>
+            <a:off x="11252200" y="6315075"/>
+            <a:ext cx="406400" cy="365125"/>
+          </a:xfrm>
+        </p:spPr>
+        <p:txBody>
+          <a:bodyPr anchor="ctr">
+            <a:normAutofit/>
+          </a:bodyPr>
+          <a:lstStyle/>
+          <a:p>
+            <a:pPr>
+              <a:spcAft>
+                <a:spcPts val="600"/>
+              </a:spcAft>
+            </a:pPr>
+            <a:fld id="{C263D6C4-4840-40CC-AC84-17E24B3B7BDE}" type="slidenum">
+              <a:rPr lang="en-US" noProof="0" smtClean="0"/>
+              <a:pPr>
+                <a:spcAft>
+                  <a:spcPts val="600"/>
+                </a:spcAft>
+              </a:pPr>
+              <a:t>17</a:t>
+            </a:fld>
+            <a:endParaRPr lang="en-US" noProof="0"/>
+          </a:p>
+        </p:txBody>
+      </p:sp>
+      <p:pic>
+        <p:nvPicPr>
+          <p:cNvPr id="5" name="Picture 4">
+            <a:extLst>
+              <a:ext uri="{FF2B5EF4-FFF2-40B4-BE49-F238E27FC236}">
+                <a16:creationId xmlns:a16="http://schemas.microsoft.com/office/drawing/2014/main" id="{DBF1AA5B-ED04-464D-999C-4C0EA56ECF63}"/>
+              </a:ext>
+            </a:extLst>
+          </p:cNvPr>
+          <p:cNvPicPr>
+            <a:picLocks noChangeAspect="1"/>
+          </p:cNvPicPr>
+          <p:nvPr/>
+        </p:nvPicPr>
+        <p:blipFill>
+          <a:blip r:embed="rId2"/>
+          <a:stretch>
+            <a:fillRect/>
+          </a:stretch>
+        </p:blipFill>
+        <p:spPr>
+          <a:xfrm>
+            <a:off x="4110087" y="1469635"/>
+            <a:ext cx="7548513" cy="4529107"/>
+          </a:xfrm>
+          <a:prstGeom prst="rect">
+            <a:avLst/>
+          </a:prstGeom>
+          <a:noFill/>
+        </p:spPr>
+      </p:pic>
+      <p:sp>
+        <p:nvSpPr>
+          <p:cNvPr id="18" name="Content Placeholder 3">
+            <a:extLst>
+              <a:ext uri="{FF2B5EF4-FFF2-40B4-BE49-F238E27FC236}">
+                <a16:creationId xmlns:a16="http://schemas.microsoft.com/office/drawing/2014/main" id="{4759441F-6F6A-42D2-A9CD-74440E3940B8}"/>
+              </a:ext>
+            </a:extLst>
+          </p:cNvPr>
+          <p:cNvSpPr>
+            <a:spLocks noGrp="1"/>
+          </p:cNvSpPr>
+          <p:nvPr>
+            <p:ph type="body" sz="half" idx="2"/>
+          </p:nvPr>
+        </p:nvSpPr>
+        <p:spPr>
+          <a:xfrm>
+            <a:off x="443366" y="1444649"/>
+            <a:ext cx="3365063" cy="4579079"/>
+          </a:xfrm>
+        </p:spPr>
+        <p:txBody>
+          <a:bodyPr>
+            <a:normAutofit/>
+          </a:bodyPr>
+          <a:lstStyle/>
+          <a:p>
+            <a:pPr marL="0" indent="0">
+              <a:buNone/>
+            </a:pPr>
+            <a:r>
+              <a:rPr lang="en-GB" dirty="0"/>
+              <a:t>This is the result of the </a:t>
+            </a:r>
+            <a:r>
+              <a:rPr lang="en-GB" dirty="0" err="1"/>
+              <a:t>scrapphoto</a:t>
+            </a:r>
+            <a:endParaRPr lang="en-SG" dirty="0"/>
+          </a:p>
+        </p:txBody>
+      </p:sp>
+    </p:spTree>
+    <p:extLst>
+      <p:ext uri="{BB962C8B-B14F-4D97-AF65-F5344CB8AC3E}">
+        <p14:creationId xmlns:p14="http://schemas.microsoft.com/office/powerpoint/2010/main" val="2930322853"/>
+      </p:ext>
+    </p:extLst>
+  </p:cSld>
+  <p:clrMapOvr>
+    <a:masterClrMapping/>
+  </p:clrMapOvr>
+  <mc:AlternateContent xmlns:mc="http://schemas.openxmlformats.org/markup-compatibility/2006">
+    <mc:Choice xmlns:p14="http://schemas.microsoft.com/office/powerpoint/2010/main" Requires="p14">
+      <p:transition spd="med" p14:dur="700">
+        <p:fade/>
+      </p:transition>
+    </mc:Choice>
+    <mc:Fallback>
+      <p:transition spd="med">
+        <p:fade/>
+      </p:transition>
+    </mc:Fallback>
+  </mc:AlternateContent>
+</p:sld>
+</file>
+
+<file path=ppt/slides/slide18.xml><?xml version="1.0" encoding="utf-8"?>
 <p:sld xmlns:a="http://schemas.openxmlformats.org/drawingml/2006/main" xmlns:r="http://schemas.openxmlformats.org/officeDocument/2006/relationships" xmlns:p="http://schemas.openxmlformats.org/presentationml/2006/main">
   <p:cSld>
     <p:spTree>
@@ -26568,9 +27016,18 @@
   <p:clrMapOvr>
     <a:masterClrMapping/>
   </p:clrMapOvr>
-  <p:transition spd="slow">
-    <p:wipe/>
-  </p:transition>
+  <mc:AlternateContent xmlns:mc="http://schemas.openxmlformats.org/markup-compatibility/2006">
+    <mc:Choice xmlns:p14="http://schemas.microsoft.com/office/powerpoint/2010/main" Requires="p14">
+      <p:transition spd="med" p14:dur="700">
+        <p:fade/>
+      </p:transition>
+    </mc:Choice>
+    <mc:Fallback>
+      <p:transition spd="med">
+        <p:fade/>
+      </p:transition>
+    </mc:Fallback>
+  </mc:AlternateContent>
 </p:sld>
 </file>
 
@@ -26680,7 +27137,7 @@
     </p:spTree>
     <p:extLst>
       <p:ext uri="{BB962C8B-B14F-4D97-AF65-F5344CB8AC3E}">
-        <p14:creationId xmlns:p14="http://schemas.microsoft.com/office/powerpoint/2010/main" val="2902794312"/>
+        <p14:creationId xmlns:p14="http://schemas.microsoft.com/office/powerpoint/2010/main" val="1286150794"/>
       </p:ext>
     </p:extLst>
   </p:cSld>
@@ -26703,134 +27160,6 @@
 </file>
 
 <file path=ppt/slides/slide3.xml><?xml version="1.0" encoding="utf-8"?>
-<p:sld xmlns:a="http://schemas.openxmlformats.org/drawingml/2006/main" xmlns:r="http://schemas.openxmlformats.org/officeDocument/2006/relationships" xmlns:p="http://schemas.openxmlformats.org/presentationml/2006/main">
-  <p:cSld>
-    <p:spTree>
-      <p:nvGrpSpPr>
-        <p:cNvPr id="1" name=""/>
-        <p:cNvGrpSpPr/>
-        <p:nvPr/>
-      </p:nvGrpSpPr>
-      <p:grpSpPr>
-        <a:xfrm>
-          <a:off x="0" y="0"/>
-          <a:ext cx="0" cy="0"/>
-          <a:chOff x="0" y="0"/>
-          <a:chExt cx="0" cy="0"/>
-        </a:xfrm>
-      </p:grpSpPr>
-      <p:sp>
-        <p:nvSpPr>
-          <p:cNvPr id="4" name="Title 3">
-            <a:extLst>
-              <a:ext uri="{FF2B5EF4-FFF2-40B4-BE49-F238E27FC236}">
-                <a16:creationId xmlns:a16="http://schemas.microsoft.com/office/drawing/2014/main" id="{E3BD8413-C238-49D7-A4E1-E8FEF1811A0E}"/>
-              </a:ext>
-            </a:extLst>
-          </p:cNvPr>
-          <p:cNvSpPr>
-            <a:spLocks noGrp="1"/>
-          </p:cNvSpPr>
-          <p:nvPr>
-            <p:ph type="title"/>
-          </p:nvPr>
-        </p:nvSpPr>
-        <p:spPr/>
-        <p:txBody>
-          <a:bodyPr/>
-          <a:lstStyle/>
-          <a:p>
-            <a:r>
-              <a:rPr lang="en-US" dirty="0"/>
-              <a:t>Version Control</a:t>
-            </a:r>
-          </a:p>
-        </p:txBody>
-      </p:sp>
-      <p:sp>
-        <p:nvSpPr>
-          <p:cNvPr id="5" name="Text Placeholder 4">
-            <a:extLst>
-              <a:ext uri="{FF2B5EF4-FFF2-40B4-BE49-F238E27FC236}">
-                <a16:creationId xmlns:a16="http://schemas.microsoft.com/office/drawing/2014/main" id="{0A95F4DE-39B7-4CE2-BC1E-8B8AE662A895}"/>
-              </a:ext>
-            </a:extLst>
-          </p:cNvPr>
-          <p:cNvSpPr>
-            <a:spLocks noGrp="1"/>
-          </p:cNvSpPr>
-          <p:nvPr>
-            <p:ph type="body" idx="1"/>
-          </p:nvPr>
-        </p:nvSpPr>
-        <p:spPr/>
-        <p:txBody>
-          <a:bodyPr/>
-          <a:lstStyle/>
-          <a:p>
-            <a:r>
-              <a:rPr lang="en-US" dirty="0"/>
-              <a:t>Using Git</a:t>
-            </a:r>
-          </a:p>
-        </p:txBody>
-      </p:sp>
-      <p:sp>
-        <p:nvSpPr>
-          <p:cNvPr id="2" name="Slide Number Placeholder 1">
-            <a:extLst>
-              <a:ext uri="{FF2B5EF4-FFF2-40B4-BE49-F238E27FC236}">
-                <a16:creationId xmlns:a16="http://schemas.microsoft.com/office/drawing/2014/main" id="{0B24BF10-2B55-43AB-9F77-F1A1410384A9}"/>
-              </a:ext>
-            </a:extLst>
-          </p:cNvPr>
-          <p:cNvSpPr>
-            <a:spLocks noGrp="1"/>
-          </p:cNvSpPr>
-          <p:nvPr>
-            <p:ph type="sldNum" sz="quarter" idx="12"/>
-          </p:nvPr>
-        </p:nvSpPr>
-        <p:spPr/>
-        <p:txBody>
-          <a:bodyPr/>
-          <a:lstStyle/>
-          <a:p>
-            <a:fld id="{C263D6C4-4840-40CC-AC84-17E24B3B7BDE}" type="slidenum">
-              <a:rPr lang="en-US" smtClean="0"/>
-              <a:pPr/>
-              <a:t>3</a:t>
-            </a:fld>
-            <a:endParaRPr lang="en-US" dirty="0"/>
-          </a:p>
-        </p:txBody>
-      </p:sp>
-    </p:spTree>
-    <p:extLst>
-      <p:ext uri="{BB962C8B-B14F-4D97-AF65-F5344CB8AC3E}">
-        <p14:creationId xmlns:p14="http://schemas.microsoft.com/office/powerpoint/2010/main" val="1286150794"/>
-      </p:ext>
-    </p:extLst>
-  </p:cSld>
-  <p:clrMapOvr>
-    <a:masterClrMapping/>
-  </p:clrMapOvr>
-  <mc:AlternateContent xmlns:mc="http://schemas.openxmlformats.org/markup-compatibility/2006">
-    <mc:Choice xmlns:p14="http://schemas.microsoft.com/office/powerpoint/2010/main" Requires="p14">
-      <p:transition spd="med" p14:dur="700">
-        <p:fade/>
-      </p:transition>
-    </mc:Choice>
-    <mc:Fallback>
-      <p:transition spd="med">
-        <p:fade/>
-      </p:transition>
-    </mc:Fallback>
-  </mc:AlternateContent>
-</p:sld>
-</file>
-
-<file path=ppt/slides/slide4.xml><?xml version="1.0" encoding="utf-8"?>
 <p:sld xmlns:a="http://schemas.openxmlformats.org/drawingml/2006/main" xmlns:r="http://schemas.openxmlformats.org/officeDocument/2006/relationships" xmlns:p="http://schemas.openxmlformats.org/presentationml/2006/main">
   <p:cSld>
     <p:spTree>
@@ -26939,7 +27268,7 @@
             <a:fld id="{C263D6C4-4840-40CC-AC84-17E24B3B7BDE}" type="slidenum">
               <a:rPr lang="en-US" smtClean="0"/>
               <a:pPr/>
-              <a:t>4</a:t>
+              <a:t>3</a:t>
             </a:fld>
             <a:endParaRPr lang="en-US" dirty="0"/>
           </a:p>
@@ -26970,7 +27299,7 @@
 </p:sld>
 </file>
 
-<file path=ppt/slides/slide5.xml><?xml version="1.0" encoding="utf-8"?>
+<file path=ppt/slides/slide4.xml><?xml version="1.0" encoding="utf-8"?>
 <p:sld xmlns:a="http://schemas.openxmlformats.org/drawingml/2006/main" xmlns:r="http://schemas.openxmlformats.org/officeDocument/2006/relationships" xmlns:p="http://schemas.openxmlformats.org/presentationml/2006/main">
   <p:cSld>
     <p:spTree>
@@ -27060,7 +27389,7 @@
                   <a:spcPts val="600"/>
                 </a:spcAft>
               </a:pPr>
-              <a:t>5</a:t>
+              <a:t>4</a:t>
             </a:fld>
             <a:endParaRPr lang="en-US" noProof="0"/>
           </a:p>
@@ -27150,10 +27479,22 @@
   <p:clrMapOvr>
     <a:masterClrMapping/>
   </p:clrMapOvr>
+  <mc:AlternateContent xmlns:mc="http://schemas.openxmlformats.org/markup-compatibility/2006">
+    <mc:Choice xmlns:p14="http://schemas.microsoft.com/office/powerpoint/2010/main" Requires="p14">
+      <p:transition spd="med" p14:dur="700">
+        <p:fade/>
+      </p:transition>
+    </mc:Choice>
+    <mc:Fallback>
+      <p:transition spd="med">
+        <p:fade/>
+      </p:transition>
+    </mc:Fallback>
+  </mc:AlternateContent>
 </p:sld>
 </file>
 
-<file path=ppt/slides/slide6.xml><?xml version="1.0" encoding="utf-8"?>
+<file path=ppt/slides/slide5.xml><?xml version="1.0" encoding="utf-8"?>
 <p:sld xmlns:a="http://schemas.openxmlformats.org/drawingml/2006/main" xmlns:r="http://schemas.openxmlformats.org/officeDocument/2006/relationships" xmlns:p="http://schemas.openxmlformats.org/presentationml/2006/main">
   <p:cSld>
     <p:spTree>
@@ -27245,7 +27586,7 @@
                   <a:spcPts val="600"/>
                 </a:spcAft>
               </a:pPr>
-              <a:t>6</a:t>
+              <a:t>5</a:t>
             </a:fld>
             <a:endParaRPr lang="en-US" noProof="0"/>
           </a:p>
@@ -27345,10 +27686,22 @@
   <p:clrMapOvr>
     <a:masterClrMapping/>
   </p:clrMapOvr>
+  <mc:AlternateContent xmlns:mc="http://schemas.openxmlformats.org/markup-compatibility/2006">
+    <mc:Choice xmlns:p14="http://schemas.microsoft.com/office/powerpoint/2010/main" Requires="p14">
+      <p:transition spd="med" p14:dur="700">
+        <p:fade/>
+      </p:transition>
+    </mc:Choice>
+    <mc:Fallback>
+      <p:transition spd="med">
+        <p:fade/>
+      </p:transition>
+    </mc:Fallback>
+  </mc:AlternateContent>
 </p:sld>
 </file>
 
-<file path=ppt/slides/slide7.xml><?xml version="1.0" encoding="utf-8"?>
+<file path=ppt/slides/slide6.xml><?xml version="1.0" encoding="utf-8"?>
 <p:sld xmlns:a="http://schemas.openxmlformats.org/drawingml/2006/main" xmlns:r="http://schemas.openxmlformats.org/officeDocument/2006/relationships" xmlns:p="http://schemas.openxmlformats.org/presentationml/2006/main">
   <p:cSld>
     <p:spTree>
@@ -27440,7 +27793,7 @@
                   <a:spcPts val="600"/>
                 </a:spcAft>
               </a:pPr>
-              <a:t>7</a:t>
+              <a:t>6</a:t>
             </a:fld>
             <a:endParaRPr lang="en-US" noProof="0"/>
           </a:p>
@@ -27523,13 +27876,13 @@
         </p:nvPicPr>
         <p:blipFill rotWithShape="1">
           <a:blip r:embed="rId2"/>
-          <a:srcRect r="1" b="11176"/>
+          <a:srcRect l="-2" r="3" b="-1967"/>
           <a:stretch/>
         </p:blipFill>
         <p:spPr>
           <a:xfrm>
             <a:off x="6474163" y="2304641"/>
-            <a:ext cx="5184437" cy="3085396"/>
+            <a:ext cx="5184437" cy="3306046"/>
           </a:xfrm>
           <a:prstGeom prst="rect">
             <a:avLst/>
@@ -27547,10 +27900,22 @@
   <p:clrMapOvr>
     <a:masterClrMapping/>
   </p:clrMapOvr>
+  <mc:AlternateContent xmlns:mc="http://schemas.openxmlformats.org/markup-compatibility/2006">
+    <mc:Choice xmlns:p14="http://schemas.microsoft.com/office/powerpoint/2010/main" Requires="p14">
+      <p:transition spd="med" p14:dur="700">
+        <p:fade/>
+      </p:transition>
+    </mc:Choice>
+    <mc:Fallback>
+      <p:transition spd="med">
+        <p:fade/>
+      </p:transition>
+    </mc:Fallback>
+  </mc:AlternateContent>
 </p:sld>
 </file>
 
-<file path=ppt/slides/slide8.xml><?xml version="1.0" encoding="utf-8"?>
+<file path=ppt/slides/slide7.xml><?xml version="1.0" encoding="utf-8"?>
 <p:sld xmlns:a="http://schemas.openxmlformats.org/drawingml/2006/main" xmlns:r="http://schemas.openxmlformats.org/officeDocument/2006/relationships" xmlns:p="http://schemas.openxmlformats.org/presentationml/2006/main">
   <p:cSld>
     <p:spTree>
@@ -27649,7 +28014,7 @@
             <a:fld id="{C263D6C4-4840-40CC-AC84-17E24B3B7BDE}" type="slidenum">
               <a:rPr lang="en-US" smtClean="0"/>
               <a:pPr/>
-              <a:t>8</a:t>
+              <a:t>7</a:t>
             </a:fld>
             <a:endParaRPr lang="en-US" dirty="0"/>
           </a:p>
@@ -27680,7 +28045,7 @@
 </p:sld>
 </file>
 
-<file path=ppt/slides/slide9.xml><?xml version="1.0" encoding="utf-8"?>
+<file path=ppt/slides/slide8.xml><?xml version="1.0" encoding="utf-8"?>
 <p:sld xmlns:a="http://schemas.openxmlformats.org/drawingml/2006/main" xmlns:r="http://schemas.openxmlformats.org/officeDocument/2006/relationships" xmlns:p="http://schemas.openxmlformats.org/presentationml/2006/main">
   <p:cSld>
     <p:spTree>
@@ -27772,7 +28137,7 @@
                   <a:spcPts val="600"/>
                 </a:spcAft>
               </a:pPr>
-              <a:t>9</a:t>
+              <a:t>8</a:t>
             </a:fld>
             <a:endParaRPr lang="en-US" noProof="0"/>
           </a:p>
@@ -27855,6 +28220,149 @@
   <p:clrMapOvr>
     <a:masterClrMapping/>
   </p:clrMapOvr>
+  <mc:AlternateContent xmlns:mc="http://schemas.openxmlformats.org/markup-compatibility/2006">
+    <mc:Choice xmlns:p14="http://schemas.microsoft.com/office/powerpoint/2010/main" Requires="p14">
+      <p:transition spd="med" p14:dur="700">
+        <p:fade/>
+      </p:transition>
+    </mc:Choice>
+    <mc:Fallback>
+      <p:transition spd="med">
+        <p:fade/>
+      </p:transition>
+    </mc:Fallback>
+  </mc:AlternateContent>
+</p:sld>
+</file>
+
+<file path=ppt/slides/slide9.xml><?xml version="1.0" encoding="utf-8"?>
+<p:sld xmlns:a="http://schemas.openxmlformats.org/drawingml/2006/main" xmlns:r="http://schemas.openxmlformats.org/officeDocument/2006/relationships" xmlns:p="http://schemas.openxmlformats.org/presentationml/2006/main">
+  <p:cSld>
+    <p:spTree>
+      <p:nvGrpSpPr>
+        <p:cNvPr id="1" name=""/>
+        <p:cNvGrpSpPr/>
+        <p:nvPr/>
+      </p:nvGrpSpPr>
+      <p:grpSpPr>
+        <a:xfrm>
+          <a:off x="0" y="0"/>
+          <a:ext cx="0" cy="0"/>
+          <a:chOff x="0" y="0"/>
+          <a:chExt cx="0" cy="0"/>
+        </a:xfrm>
+      </p:grpSpPr>
+      <p:sp>
+        <p:nvSpPr>
+          <p:cNvPr id="4" name="Title 3">
+            <a:extLst>
+              <a:ext uri="{FF2B5EF4-FFF2-40B4-BE49-F238E27FC236}">
+                <a16:creationId xmlns:a16="http://schemas.microsoft.com/office/drawing/2014/main" id="{BD179B88-D43C-4A31-9A52-3498E9430782}"/>
+              </a:ext>
+            </a:extLst>
+          </p:cNvPr>
+          <p:cNvSpPr>
+            <a:spLocks noGrp="1"/>
+          </p:cNvSpPr>
+          <p:nvPr>
+            <p:ph type="title"/>
+          </p:nvPr>
+        </p:nvSpPr>
+        <p:spPr/>
+        <p:txBody>
+          <a:bodyPr>
+            <a:normAutofit/>
+          </a:bodyPr>
+          <a:lstStyle/>
+          <a:p>
+            <a:r>
+              <a:rPr lang="en-US" dirty="0" err="1"/>
+              <a:t>Webcrawling</a:t>
+            </a:r>
+            <a:endParaRPr lang="en-US" dirty="0"/>
+          </a:p>
+        </p:txBody>
+      </p:sp>
+      <p:sp>
+        <p:nvSpPr>
+          <p:cNvPr id="5" name="Text Placeholder 4">
+            <a:extLst>
+              <a:ext uri="{FF2B5EF4-FFF2-40B4-BE49-F238E27FC236}">
+                <a16:creationId xmlns:a16="http://schemas.microsoft.com/office/drawing/2014/main" id="{DCDDBE65-9AB1-4989-AF86-726591A6A128}"/>
+              </a:ext>
+            </a:extLst>
+          </p:cNvPr>
+          <p:cNvSpPr>
+            <a:spLocks noGrp="1"/>
+          </p:cNvSpPr>
+          <p:nvPr>
+            <p:ph type="body" idx="1"/>
+          </p:nvPr>
+        </p:nvSpPr>
+        <p:spPr/>
+        <p:txBody>
+          <a:bodyPr/>
+          <a:lstStyle/>
+          <a:p>
+            <a:r>
+              <a:rPr lang="en-US" dirty="0"/>
+              <a:t>With Scrapy</a:t>
+            </a:r>
+          </a:p>
+        </p:txBody>
+      </p:sp>
+      <p:sp>
+        <p:nvSpPr>
+          <p:cNvPr id="2" name="Slide Number Placeholder 1">
+            <a:extLst>
+              <a:ext uri="{FF2B5EF4-FFF2-40B4-BE49-F238E27FC236}">
+                <a16:creationId xmlns:a16="http://schemas.microsoft.com/office/drawing/2014/main" id="{8B065C75-272B-4BB5-BA23-D80E8654D621}"/>
+              </a:ext>
+            </a:extLst>
+          </p:cNvPr>
+          <p:cNvSpPr>
+            <a:spLocks noGrp="1"/>
+          </p:cNvSpPr>
+          <p:nvPr>
+            <p:ph type="sldNum" sz="quarter" idx="12"/>
+          </p:nvPr>
+        </p:nvSpPr>
+        <p:spPr/>
+        <p:txBody>
+          <a:bodyPr/>
+          <a:lstStyle/>
+          <a:p>
+            <a:fld id="{C263D6C4-4840-40CC-AC84-17E24B3B7BDE}" type="slidenum">
+              <a:rPr lang="en-US" smtClean="0"/>
+              <a:pPr/>
+              <a:t>9</a:t>
+            </a:fld>
+            <a:endParaRPr lang="en-US" dirty="0"/>
+          </a:p>
+        </p:txBody>
+      </p:sp>
+    </p:spTree>
+    <p:extLst>
+      <p:ext uri="{BB962C8B-B14F-4D97-AF65-F5344CB8AC3E}">
+        <p14:creationId xmlns:p14="http://schemas.microsoft.com/office/powerpoint/2010/main" val="2035294720"/>
+      </p:ext>
+    </p:extLst>
+  </p:cSld>
+  <p:clrMapOvr>
+    <a:masterClrMapping/>
+  </p:clrMapOvr>
+  <mc:AlternateContent xmlns:mc="http://schemas.openxmlformats.org/markup-compatibility/2006" xmlns:p14="http://schemas.microsoft.com/office/powerpoint/2010/main">
+    <mc:Choice Requires="p14">
+      <p:transition spd="med" p14:dur="700">
+        <p:fade/>
+      </p:transition>
+    </mc:Choice>
+    <mc:Fallback xmlns="">
+      <p:transition spd="med">
+        <p:fade/>
+      </p:transition>
+    </mc:Fallback>
+  </mc:AlternateContent>
 </p:sld>
 </file>
 
@@ -28650,14 +29158,6 @@
 </file>
 
 <file path=customXml/item1.xml><?xml version="1.0" encoding="utf-8"?>
-<p:properties xmlns:p="http://schemas.microsoft.com/office/2006/metadata/properties" xmlns:xsi="http://www.w3.org/2001/XMLSchema-instance" xmlns:pc="http://schemas.microsoft.com/office/infopath/2007/PartnerControls">
-  <documentManagement>
-    <MediaServiceKeyPoints xmlns="71af3243-3dd4-4a8d-8c0d-dd76da1f02a5" xsi:nil="true"/>
-  </documentManagement>
-</p:properties>
-</file>
-
-<file path=customXml/item2.xml><?xml version="1.0" encoding="utf-8"?>
 <ct:contentTypeSchema xmlns:ct="http://schemas.microsoft.com/office/2006/metadata/contentType" xmlns:ma="http://schemas.microsoft.com/office/2006/metadata/properties/metaAttributes" ct:_="" ma:_="" ma:contentTypeName="Document" ma:contentTypeID="0x01010079F111ED35F8CC479449609E8A0923A6" ma:contentTypeVersion="11" ma:contentTypeDescription="Create a new document." ma:contentTypeScope="" ma:versionID="96291512c1ee715ab617f4c07df79fc1">
   <xsd:schema xmlns:xsd="http://www.w3.org/2001/XMLSchema" xmlns:xs="http://www.w3.org/2001/XMLSchema" xmlns:p="http://schemas.microsoft.com/office/2006/metadata/properties" xmlns:ns2="71af3243-3dd4-4a8d-8c0d-dd76da1f02a5" xmlns:ns3="16c05727-aa75-4e4a-9b5f-8a80a1165891" targetNamespace="http://schemas.microsoft.com/office/2006/metadata/properties" ma:root="true" ma:fieldsID="8256c27c40ca5c40ce1cf6c44f0205df" ns2:_="" ns3:_="">
     <xsd:import namespace="71af3243-3dd4-4a8d-8c0d-dd76da1f02a5"/>
@@ -28868,7 +29368,7 @@
 </ct:contentTypeSchema>
 </file>
 
-<file path=customXml/item3.xml><?xml version="1.0" encoding="utf-8"?>
+<file path=customXml/item2.xml><?xml version="1.0" encoding="utf-8"?>
 <?mso-contentType ?>
 <FormTemplates xmlns="http://schemas.microsoft.com/sharepoint/v3/contenttype/forms">
   <Display>DocumentLibraryForm</Display>
@@ -28877,17 +29377,15 @@
 </FormTemplates>
 </file>
 
-<file path=customXml/itemProps1.xml><?xml version="1.0" encoding="utf-8"?>
-<ds:datastoreItem xmlns:ds="http://schemas.openxmlformats.org/officeDocument/2006/customXml" ds:itemID="{F5757914-1161-4661-9696-421FD6935CDD}">
-  <ds:schemaRefs>
-    <ds:schemaRef ds:uri="http://schemas.microsoft.com/office/2006/metadata/properties"/>
-    <ds:schemaRef ds:uri="http://schemas.microsoft.com/office/infopath/2007/PartnerControls"/>
-    <ds:schemaRef ds:uri="71af3243-3dd4-4a8d-8c0d-dd76da1f02a5"/>
-  </ds:schemaRefs>
-</ds:datastoreItem>
+<file path=customXml/item3.xml><?xml version="1.0" encoding="utf-8"?>
+<p:properties xmlns:p="http://schemas.microsoft.com/office/2006/metadata/properties" xmlns:xsi="http://www.w3.org/2001/XMLSchema-instance" xmlns:pc="http://schemas.microsoft.com/office/infopath/2007/PartnerControls">
+  <documentManagement>
+    <MediaServiceKeyPoints xmlns="71af3243-3dd4-4a8d-8c0d-dd76da1f02a5" xsi:nil="true"/>
+  </documentManagement>
+</p:properties>
 </file>
 
-<file path=customXml/itemProps2.xml><?xml version="1.0" encoding="utf-8"?>
+<file path=customXml/itemProps1.xml><?xml version="1.0" encoding="utf-8"?>
 <ds:datastoreItem xmlns:ds="http://schemas.openxmlformats.org/officeDocument/2006/customXml" ds:itemID="{4C103400-4A22-4E35-B588-4C4D42638959}">
   <ds:schemaRefs>
     <ds:schemaRef ds:uri="http://schemas.microsoft.com/office/2006/metadata/contentType"/>
@@ -28906,10 +29404,20 @@
 </ds:datastoreItem>
 </file>
 
-<file path=customXml/itemProps3.xml><?xml version="1.0" encoding="utf-8"?>
+<file path=customXml/itemProps2.xml><?xml version="1.0" encoding="utf-8"?>
 <ds:datastoreItem xmlns:ds="http://schemas.openxmlformats.org/officeDocument/2006/customXml" ds:itemID="{5B26E0C9-B2AA-42E6-97B6-E1B7D9EAF129}">
   <ds:schemaRefs>
     <ds:schemaRef ds:uri="http://schemas.microsoft.com/sharepoint/v3/contenttype/forms"/>
   </ds:schemaRefs>
 </ds:datastoreItem>
+</file>
+
+<file path=customXml/itemProps3.xml><?xml version="1.0" encoding="utf-8"?>
+<ds:datastoreItem xmlns:ds="http://schemas.openxmlformats.org/officeDocument/2006/customXml" ds:itemID="{F5757914-1161-4661-9696-421FD6935CDD}">
+  <ds:schemaRefs>
+    <ds:schemaRef ds:uri="http://schemas.microsoft.com/office/2006/metadata/properties"/>
+    <ds:schemaRef ds:uri="http://schemas.microsoft.com/office/infopath/2007/PartnerControls"/>
+    <ds:schemaRef ds:uri="71af3243-3dd4-4a8d-8c0d-dd76da1f02a5"/>
+  </ds:schemaRefs>
+</ds:datastoreItem>
 </file>
</xml_diff>